<commit_message>
push Pertemuan_1, Pertemuan_2, dan Pertemuan_3 Kursus Computer Vision
</commit_message>
<xml_diff>
--- a/Kursus Computer Vision/Pengenalan Anaconda Dan VS Code Jupyter Notebook.pptx
+++ b/Kursus Computer Vision/Pengenalan Anaconda Dan VS Code Jupyter Notebook.pptx
@@ -8005,7 +8005,7 @@
         <p:spPr>
           <a:xfrm>
             <a:off x="270510" y="1078230"/>
-            <a:ext cx="11937365" cy="2122805"/>
+            <a:ext cx="10915015" cy="2061210"/>
           </a:xfrm>
           <a:prstGeom prst="rect">
             <a:avLst/>
@@ -8080,20 +8080,20 @@
               </a:rPr>
             </a:br>
             <a:r>
-              <a:rPr lang="en-US" sz="1600">
+              <a:rPr lang="en-US" sz="1400">
                 <a:latin typeface="Cascadia Mono Light" panose="020B0609020000020004" charset="0"/>
                 <a:cs typeface="Cascadia Mono Light" panose="020B0609020000020004" charset="0"/>
               </a:rPr>
               <a:t>pip install --default-timeout=300 -r </a:t>
             </a:r>
             <a:r>
-              <a:rPr lang="en-US" altLang="en-US" sz="1600">
+              <a:rPr lang="en-US" altLang="en-US" sz="1400">
                 <a:latin typeface="Cascadia Mono Light" panose="020B0609020000020004" charset="0"/>
                 <a:cs typeface="Cascadia Mono Light" panose="020B0609020000020004" charset="0"/>
               </a:rPr>
               <a:t>https://raw.githubusercontent.com/Muhammad-Yunus/Telkomsat-Kursus-CV-And-OD/refs/heads/main/Kursus%20Computer%20Vision/requirements.txt</a:t>
             </a:r>
-            <a:endParaRPr lang="en-US" altLang="en-US" sz="1600">
+            <a:endParaRPr lang="en-US" altLang="en-US" sz="1400">
               <a:latin typeface="Cascadia Mono Light" panose="020B0609020000020004" charset="0"/>
               <a:cs typeface="Cascadia Mono Light" panose="020B0609020000020004" charset="0"/>
             </a:endParaRPr>

</xml_diff>